<commit_message>
Fixed typo --dryrun to --dry-run
</commit_message>
<xml_diff>
--- a/2025-03 - EESSI test suite at EUM25.pptx
+++ b/2025-03 - EESSI test suite at EUM25.pptx
@@ -15,8 +15,8 @@
     <p:sldId id="490" r:id="rId6"/>
     <p:sldId id="503" r:id="rId7"/>
     <p:sldId id="504" r:id="rId8"/>
-    <p:sldId id="491" r:id="rId9"/>
-    <p:sldId id="505" r:id="rId10"/>
+    <p:sldId id="505" r:id="rId9"/>
+    <p:sldId id="491" r:id="rId10"/>
     <p:sldId id="492" r:id="rId11"/>
     <p:sldId id="493" r:id="rId12"/>
     <p:sldId id="494" r:id="rId13"/>
@@ -13080,21 +13080,7 @@
                 <a:latin typeface="Courier New" panose="02070309020205020404" pitchFamily="49" charset="0"/>
                 <a:cs typeface="Courier New" panose="02070309020205020404" pitchFamily="49" charset="0"/>
               </a:rPr>
-              <a:t>reframe --</a:t>
-            </a:r>
-            <a:r>
-              <a:rPr lang="en-US" sz="1800" dirty="0" err="1">
-                <a:latin typeface="Courier New" panose="02070309020205020404" pitchFamily="49" charset="0"/>
-                <a:cs typeface="Courier New" panose="02070309020205020404" pitchFamily="49" charset="0"/>
-              </a:rPr>
-              <a:t>dryrun</a:t>
-            </a:r>
-            <a:r>
-              <a:rPr lang="en-US" sz="1800" dirty="0">
-                <a:latin typeface="Courier New" panose="02070309020205020404" pitchFamily="49" charset="0"/>
-                <a:cs typeface="Courier New" panose="02070309020205020404" pitchFamily="49" charset="0"/>
-              </a:rPr>
-              <a:t> -t CI –n /&lt;</a:t>
+              <a:t>reframe --dry-run -t CI –n /&lt;</a:t>
             </a:r>
             <a:r>
               <a:rPr lang="en-US" sz="1800" dirty="0" err="1">
@@ -13798,21 +13784,7 @@
                 <a:latin typeface="Source Sans Pro"/>
                 <a:ea typeface="Source Sans Pro"/>
               </a:rPr>
-              <a:t>Step 4: run reframe --</a:t>
-            </a:r>
-            <a:r>
-              <a:rPr lang="en-GB" sz="2600" dirty="0" err="1">
-                <a:latin typeface="Source Sans Pro"/>
-                <a:ea typeface="Source Sans Pro"/>
-              </a:rPr>
-              <a:t>dryrun</a:t>
-            </a:r>
-            <a:r>
-              <a:rPr lang="en-GB" sz="2600" dirty="0">
-                <a:latin typeface="Source Sans Pro"/>
-                <a:ea typeface="Source Sans Pro"/>
-              </a:rPr>
-              <a:t> -t CI</a:t>
+              <a:t>Step 4: run reframe --dry-run -t CI</a:t>
             </a:r>
             <a:endParaRPr lang="en-US" sz="2600" dirty="0"/>
           </a:p>
@@ -20653,711 +20625,6 @@
         <p:cNvPr id="1" name="">
           <a:extLst>
             <a:ext uri="{FF2B5EF4-FFF2-40B4-BE49-F238E27FC236}">
-              <a16:creationId xmlns:a16="http://schemas.microsoft.com/office/drawing/2014/main" id="{D284020F-D1C3-F659-4847-1574422A77E4}"/>
-            </a:ext>
-          </a:extLst>
-        </p:cNvPr>
-        <p:cNvGrpSpPr/>
-        <p:nvPr/>
-      </p:nvGrpSpPr>
-      <p:grpSpPr>
-        <a:xfrm>
-          <a:off x="0" y="0"/>
-          <a:ext cx="0" cy="0"/>
-          <a:chOff x="0" y="0"/>
-          <a:chExt cx="0" cy="0"/>
-        </a:xfrm>
-      </p:grpSpPr>
-      <p:sp>
-        <p:nvSpPr>
-          <p:cNvPr id="5" name="Text Placeholder 4">
-            <a:extLst>
-              <a:ext uri="{FF2B5EF4-FFF2-40B4-BE49-F238E27FC236}">
-                <a16:creationId xmlns:a16="http://schemas.microsoft.com/office/drawing/2014/main" id="{CBEE9C12-4F61-7C08-E9A6-F911EB399C3F}"/>
-              </a:ext>
-            </a:extLst>
-          </p:cNvPr>
-          <p:cNvSpPr>
-            <a:spLocks noGrp="1"/>
-          </p:cNvSpPr>
-          <p:nvPr>
-            <p:ph type="body" idx="1"/>
-          </p:nvPr>
-        </p:nvSpPr>
-        <p:spPr>
-          <a:xfrm>
-            <a:off x="443017" y="772766"/>
-            <a:ext cx="8390739" cy="3791283"/>
-          </a:xfrm>
-        </p:spPr>
-        <p:txBody>
-          <a:bodyPr/>
-          <a:lstStyle/>
-          <a:p>
-            <a:pPr marL="76200" indent="0">
-              <a:buNone/>
-            </a:pPr>
-            <a:r>
-              <a:rPr lang="en-US" sz="1800" dirty="0"/>
-              <a:t>Goal: For everyone to have run the EESSI test suite on your HPC cluster (or laptop) by the end of EUM’25!</a:t>
-            </a:r>
-          </a:p>
-          <a:p>
-            <a:r>
-              <a:rPr lang="en-US" sz="1800" dirty="0"/>
-              <a:t>Step 1: install </a:t>
-            </a:r>
-            <a:r>
-              <a:rPr lang="en-US" sz="1800" dirty="0" err="1"/>
-              <a:t>ReFrame</a:t>
-            </a:r>
-            <a:r>
-              <a:rPr lang="en-US" sz="1800" dirty="0"/>
-              <a:t> &amp; the EESSI test suite</a:t>
-            </a:r>
-          </a:p>
-          <a:p>
-            <a:r>
-              <a:rPr lang="en-US" sz="1800" dirty="0"/>
-              <a:t>Step 2: create a </a:t>
-            </a:r>
-            <a:r>
-              <a:rPr lang="en-US" sz="1800" dirty="0" err="1"/>
-              <a:t>ReFrame</a:t>
-            </a:r>
-            <a:r>
-              <a:rPr lang="en-US" sz="1800" dirty="0"/>
-              <a:t> configuration file</a:t>
-            </a:r>
-          </a:p>
-          <a:p>
-            <a:r>
-              <a:rPr lang="en-US" sz="1800" dirty="0"/>
-              <a:t>Step 3: run reframe --list -t CI</a:t>
-            </a:r>
-          </a:p>
-          <a:p>
-            <a:r>
-              <a:rPr lang="en-US" sz="1800" dirty="0"/>
-              <a:t>Step 4: run reframe --</a:t>
-            </a:r>
-            <a:r>
-              <a:rPr lang="en-US" sz="1800" dirty="0" err="1"/>
-              <a:t>dryrun</a:t>
-            </a:r>
-            <a:r>
-              <a:rPr lang="en-US" sz="1800" dirty="0"/>
-              <a:t> -t CI -n /&lt;</a:t>
-            </a:r>
-            <a:r>
-              <a:rPr lang="en-US" sz="1800" dirty="0" err="1"/>
-              <a:t>somehash</a:t>
-            </a:r>
-            <a:r>
-              <a:rPr lang="en-US" sz="1800" dirty="0"/>
-              <a:t>&gt;</a:t>
-            </a:r>
-          </a:p>
-          <a:p>
-            <a:r>
-              <a:rPr lang="en-US" sz="1800" dirty="0"/>
-              <a:t>Step 5: run reframe --run -t CI -n /&lt;</a:t>
-            </a:r>
-            <a:r>
-              <a:rPr lang="en-US" sz="1800" dirty="0" err="1"/>
-              <a:t>somehash</a:t>
-            </a:r>
-            <a:r>
-              <a:rPr lang="en-US" sz="1800" dirty="0"/>
-              <a:t>&gt;</a:t>
-            </a:r>
-          </a:p>
-          <a:p>
-            <a:endParaRPr lang="en-US" sz="1800" dirty="0"/>
-          </a:p>
-          <a:p>
-            <a:endParaRPr lang="en-US" sz="1800" dirty="0"/>
-          </a:p>
-        </p:txBody>
-      </p:sp>
-      <p:sp>
-        <p:nvSpPr>
-          <p:cNvPr id="3" name="Google Shape;79;p13">
-            <a:extLst>
-              <a:ext uri="{FF2B5EF4-FFF2-40B4-BE49-F238E27FC236}">
-                <a16:creationId xmlns:a16="http://schemas.microsoft.com/office/drawing/2014/main" id="{568DDED2-C88F-0B39-C491-DBB6C128B415}"/>
-              </a:ext>
-            </a:extLst>
-          </p:cNvPr>
-          <p:cNvSpPr txBox="1">
-            <a:spLocks/>
-          </p:cNvSpPr>
-          <p:nvPr/>
-        </p:nvSpPr>
-        <p:spPr>
-          <a:xfrm>
-            <a:off x="-105683" y="4773864"/>
-            <a:ext cx="548700" cy="393600"/>
-          </a:xfrm>
-          <a:prstGeom prst="rect">
-            <a:avLst/>
-          </a:prstGeom>
-        </p:spPr>
-        <p:txBody>
-          <a:bodyPr spcFirstLastPara="1" wrap="square" lIns="91425" tIns="91425" rIns="91425" bIns="91425" anchor="t" anchorCtr="0">
-            <a:noAutofit/>
-          </a:bodyPr>
-          <a:lstStyle>
-            <a:defPPr marR="0" lvl="0" algn="l" rtl="0">
-              <a:lnSpc>
-                <a:spcPct val="100000"/>
-              </a:lnSpc>
-              <a:spcBef>
-                <a:spcPts val="0"/>
-              </a:spcBef>
-              <a:spcAft>
-                <a:spcPts val="0"/>
-              </a:spcAft>
-            </a:defPPr>
-            <a:lvl1pPr marR="0" lvl="0" algn="l" rtl="0">
-              <a:lnSpc>
-                <a:spcPct val="100000"/>
-              </a:lnSpc>
-              <a:spcBef>
-                <a:spcPts val="0"/>
-              </a:spcBef>
-              <a:spcAft>
-                <a:spcPts val="0"/>
-              </a:spcAft>
-              <a:buClr>
-                <a:srgbClr val="000000"/>
-              </a:buClr>
-              <a:buFont typeface="Arial"/>
-              <a:defRPr sz="1400" b="0" i="0" u="none" strike="noStrike" cap="none">
-                <a:solidFill>
-                  <a:srgbClr val="000000"/>
-                </a:solidFill>
-                <a:latin typeface="Arial"/>
-                <a:ea typeface="Arial"/>
-                <a:cs typeface="Arial"/>
-                <a:sym typeface="Arial"/>
-              </a:defRPr>
-            </a:lvl1pPr>
-            <a:lvl2pPr marR="0" lvl="1" algn="l" rtl="0">
-              <a:lnSpc>
-                <a:spcPct val="100000"/>
-              </a:lnSpc>
-              <a:spcBef>
-                <a:spcPts val="0"/>
-              </a:spcBef>
-              <a:spcAft>
-                <a:spcPts val="0"/>
-              </a:spcAft>
-              <a:buClr>
-                <a:srgbClr val="000000"/>
-              </a:buClr>
-              <a:buFont typeface="Arial"/>
-              <a:defRPr sz="1400" b="0" i="0" u="none" strike="noStrike" cap="none">
-                <a:solidFill>
-                  <a:srgbClr val="000000"/>
-                </a:solidFill>
-                <a:latin typeface="Arial"/>
-                <a:ea typeface="Arial"/>
-                <a:cs typeface="Arial"/>
-                <a:sym typeface="Arial"/>
-              </a:defRPr>
-            </a:lvl2pPr>
-            <a:lvl3pPr marR="0" lvl="2" algn="l" rtl="0">
-              <a:lnSpc>
-                <a:spcPct val="100000"/>
-              </a:lnSpc>
-              <a:spcBef>
-                <a:spcPts val="0"/>
-              </a:spcBef>
-              <a:spcAft>
-                <a:spcPts val="0"/>
-              </a:spcAft>
-              <a:buClr>
-                <a:srgbClr val="000000"/>
-              </a:buClr>
-              <a:buFont typeface="Arial"/>
-              <a:defRPr sz="1400" b="0" i="0" u="none" strike="noStrike" cap="none">
-                <a:solidFill>
-                  <a:srgbClr val="000000"/>
-                </a:solidFill>
-                <a:latin typeface="Arial"/>
-                <a:ea typeface="Arial"/>
-                <a:cs typeface="Arial"/>
-                <a:sym typeface="Arial"/>
-              </a:defRPr>
-            </a:lvl3pPr>
-            <a:lvl4pPr marR="0" lvl="3" algn="l" rtl="0">
-              <a:lnSpc>
-                <a:spcPct val="100000"/>
-              </a:lnSpc>
-              <a:spcBef>
-                <a:spcPts val="0"/>
-              </a:spcBef>
-              <a:spcAft>
-                <a:spcPts val="0"/>
-              </a:spcAft>
-              <a:buClr>
-                <a:srgbClr val="000000"/>
-              </a:buClr>
-              <a:buFont typeface="Arial"/>
-              <a:defRPr sz="1400" b="0" i="0" u="none" strike="noStrike" cap="none">
-                <a:solidFill>
-                  <a:srgbClr val="000000"/>
-                </a:solidFill>
-                <a:latin typeface="Arial"/>
-                <a:ea typeface="Arial"/>
-                <a:cs typeface="Arial"/>
-                <a:sym typeface="Arial"/>
-              </a:defRPr>
-            </a:lvl4pPr>
-            <a:lvl5pPr marR="0" lvl="4" algn="l" rtl="0">
-              <a:lnSpc>
-                <a:spcPct val="100000"/>
-              </a:lnSpc>
-              <a:spcBef>
-                <a:spcPts val="0"/>
-              </a:spcBef>
-              <a:spcAft>
-                <a:spcPts val="0"/>
-              </a:spcAft>
-              <a:buClr>
-                <a:srgbClr val="000000"/>
-              </a:buClr>
-              <a:buFont typeface="Arial"/>
-              <a:defRPr sz="1400" b="0" i="0" u="none" strike="noStrike" cap="none">
-                <a:solidFill>
-                  <a:srgbClr val="000000"/>
-                </a:solidFill>
-                <a:latin typeface="Arial"/>
-                <a:ea typeface="Arial"/>
-                <a:cs typeface="Arial"/>
-                <a:sym typeface="Arial"/>
-              </a:defRPr>
-            </a:lvl5pPr>
-            <a:lvl6pPr marR="0" lvl="5" algn="l" rtl="0">
-              <a:lnSpc>
-                <a:spcPct val="100000"/>
-              </a:lnSpc>
-              <a:spcBef>
-                <a:spcPts val="0"/>
-              </a:spcBef>
-              <a:spcAft>
-                <a:spcPts val="0"/>
-              </a:spcAft>
-              <a:buClr>
-                <a:srgbClr val="000000"/>
-              </a:buClr>
-              <a:buFont typeface="Arial"/>
-              <a:defRPr sz="1400" b="0" i="0" u="none" strike="noStrike" cap="none">
-                <a:solidFill>
-                  <a:srgbClr val="000000"/>
-                </a:solidFill>
-                <a:latin typeface="Arial"/>
-                <a:ea typeface="Arial"/>
-                <a:cs typeface="Arial"/>
-                <a:sym typeface="Arial"/>
-              </a:defRPr>
-            </a:lvl6pPr>
-            <a:lvl7pPr marR="0" lvl="6" algn="l" rtl="0">
-              <a:lnSpc>
-                <a:spcPct val="100000"/>
-              </a:lnSpc>
-              <a:spcBef>
-                <a:spcPts val="0"/>
-              </a:spcBef>
-              <a:spcAft>
-                <a:spcPts val="0"/>
-              </a:spcAft>
-              <a:buClr>
-                <a:srgbClr val="000000"/>
-              </a:buClr>
-              <a:buFont typeface="Arial"/>
-              <a:defRPr sz="1400" b="0" i="0" u="none" strike="noStrike" cap="none">
-                <a:solidFill>
-                  <a:srgbClr val="000000"/>
-                </a:solidFill>
-                <a:latin typeface="Arial"/>
-                <a:ea typeface="Arial"/>
-                <a:cs typeface="Arial"/>
-                <a:sym typeface="Arial"/>
-              </a:defRPr>
-            </a:lvl7pPr>
-            <a:lvl8pPr marR="0" lvl="7" algn="l" rtl="0">
-              <a:lnSpc>
-                <a:spcPct val="100000"/>
-              </a:lnSpc>
-              <a:spcBef>
-                <a:spcPts val="0"/>
-              </a:spcBef>
-              <a:spcAft>
-                <a:spcPts val="0"/>
-              </a:spcAft>
-              <a:buClr>
-                <a:srgbClr val="000000"/>
-              </a:buClr>
-              <a:buFont typeface="Arial"/>
-              <a:defRPr sz="1400" b="0" i="0" u="none" strike="noStrike" cap="none">
-                <a:solidFill>
-                  <a:srgbClr val="000000"/>
-                </a:solidFill>
-                <a:latin typeface="Arial"/>
-                <a:ea typeface="Arial"/>
-                <a:cs typeface="Arial"/>
-                <a:sym typeface="Arial"/>
-              </a:defRPr>
-            </a:lvl8pPr>
-            <a:lvl9pPr marR="0" lvl="8" algn="l" rtl="0">
-              <a:lnSpc>
-                <a:spcPct val="100000"/>
-              </a:lnSpc>
-              <a:spcBef>
-                <a:spcPts val="0"/>
-              </a:spcBef>
-              <a:spcAft>
-                <a:spcPts val="0"/>
-              </a:spcAft>
-              <a:buClr>
-                <a:srgbClr val="000000"/>
-              </a:buClr>
-              <a:buFont typeface="Arial"/>
-              <a:defRPr sz="1400" b="0" i="0" u="none" strike="noStrike" cap="none">
-                <a:solidFill>
-                  <a:srgbClr val="000000"/>
-                </a:solidFill>
-                <a:latin typeface="Arial"/>
-                <a:ea typeface="Arial"/>
-                <a:cs typeface="Arial"/>
-                <a:sym typeface="Arial"/>
-              </a:defRPr>
-            </a:lvl9pPr>
-          </a:lstStyle>
-          <a:p>
-            <a:pPr algn="r"/>
-            <a:fld id="{00000000-1234-1234-1234-123412341234}" type="slidenum">
-              <a:rPr lang="en"/>
-              <a:pPr algn="r"/>
-              <a:t>8</a:t>
-            </a:fld>
-            <a:endParaRPr lang="en" dirty="0"/>
-          </a:p>
-        </p:txBody>
-      </p:sp>
-      <p:sp>
-        <p:nvSpPr>
-          <p:cNvPr id="7" name="Title 3">
-            <a:extLst>
-              <a:ext uri="{FF2B5EF4-FFF2-40B4-BE49-F238E27FC236}">
-                <a16:creationId xmlns:a16="http://schemas.microsoft.com/office/drawing/2014/main" id="{1981D1B7-9D9D-244D-04CD-DA7D333C4A46}"/>
-              </a:ext>
-            </a:extLst>
-          </p:cNvPr>
-          <p:cNvSpPr txBox="1">
-            <a:spLocks/>
-          </p:cNvSpPr>
-          <p:nvPr/>
-        </p:nvSpPr>
-        <p:spPr>
-          <a:xfrm>
-            <a:off x="424543" y="70166"/>
-            <a:ext cx="8523515" cy="702600"/>
-          </a:xfrm>
-          <a:prstGeom prst="rect">
-            <a:avLst/>
-          </a:prstGeom>
-          <a:noFill/>
-          <a:ln>
-            <a:noFill/>
-          </a:ln>
-        </p:spPr>
-        <p:txBody>
-          <a:bodyPr spcFirstLastPara="1" wrap="square" lIns="91425" tIns="91425" rIns="91425" bIns="91425" anchor="b" anchorCtr="0">
-            <a:noAutofit/>
-          </a:bodyPr>
-          <a:lstStyle>
-            <a:defPPr marR="0" lvl="0" algn="l" rtl="0">
-              <a:lnSpc>
-                <a:spcPct val="100000"/>
-              </a:lnSpc>
-              <a:spcBef>
-                <a:spcPts val="0"/>
-              </a:spcBef>
-              <a:spcAft>
-                <a:spcPts val="0"/>
-              </a:spcAft>
-            </a:defPPr>
-            <a:lvl1pPr marR="0" lvl="0" algn="l" rtl="0" eaLnBrk="1" hangingPunct="1">
-              <a:lnSpc>
-                <a:spcPct val="100000"/>
-              </a:lnSpc>
-              <a:spcBef>
-                <a:spcPts val="0"/>
-              </a:spcBef>
-              <a:spcAft>
-                <a:spcPts val="0"/>
-              </a:spcAft>
-              <a:buClr>
-                <a:schemeClr val="accent1"/>
-              </a:buClr>
-              <a:buSzPts val="2000"/>
-              <a:buFont typeface="Roboto Slab"/>
-              <a:buNone/>
-              <a:defRPr sz="2800" b="0" i="0" u="none" strike="noStrike" cap="none">
-                <a:solidFill>
-                  <a:schemeClr val="accent1"/>
-                </a:solidFill>
-                <a:latin typeface="Source Sans Pro" panose="020B0503030403020204" pitchFamily="34" charset="0"/>
-                <a:ea typeface="Source Sans Pro" panose="020B0503030403020204" pitchFamily="34" charset="0"/>
-                <a:cs typeface="Roboto Slab"/>
-                <a:sym typeface="Roboto Slab"/>
-              </a:defRPr>
-            </a:lvl1pPr>
-            <a:lvl2pPr marR="0" lvl="1" algn="l" rtl="0" eaLnBrk="1" hangingPunct="1">
-              <a:lnSpc>
-                <a:spcPct val="100000"/>
-              </a:lnSpc>
-              <a:spcBef>
-                <a:spcPts val="0"/>
-              </a:spcBef>
-              <a:spcAft>
-                <a:spcPts val="0"/>
-              </a:spcAft>
-              <a:buClr>
-                <a:schemeClr val="accent1"/>
-              </a:buClr>
-              <a:buSzPts val="2000"/>
-              <a:buFont typeface="Roboto Slab"/>
-              <a:buNone/>
-              <a:defRPr sz="2000" b="0" i="0" u="none" strike="noStrike" cap="none">
-                <a:solidFill>
-                  <a:schemeClr val="accent1"/>
-                </a:solidFill>
-                <a:latin typeface="Roboto Slab"/>
-                <a:ea typeface="Roboto Slab"/>
-                <a:cs typeface="Roboto Slab"/>
-                <a:sym typeface="Roboto Slab"/>
-              </a:defRPr>
-            </a:lvl2pPr>
-            <a:lvl3pPr marR="0" lvl="2" algn="l" rtl="0" eaLnBrk="1" hangingPunct="1">
-              <a:lnSpc>
-                <a:spcPct val="100000"/>
-              </a:lnSpc>
-              <a:spcBef>
-                <a:spcPts val="0"/>
-              </a:spcBef>
-              <a:spcAft>
-                <a:spcPts val="0"/>
-              </a:spcAft>
-              <a:buClr>
-                <a:schemeClr val="accent1"/>
-              </a:buClr>
-              <a:buSzPts val="2000"/>
-              <a:buFont typeface="Roboto Slab"/>
-              <a:buNone/>
-              <a:defRPr sz="2000" b="0" i="0" u="none" strike="noStrike" cap="none">
-                <a:solidFill>
-                  <a:schemeClr val="accent1"/>
-                </a:solidFill>
-                <a:latin typeface="Roboto Slab"/>
-                <a:ea typeface="Roboto Slab"/>
-                <a:cs typeface="Roboto Slab"/>
-                <a:sym typeface="Roboto Slab"/>
-              </a:defRPr>
-            </a:lvl3pPr>
-            <a:lvl4pPr marR="0" lvl="3" algn="l" rtl="0" eaLnBrk="1" hangingPunct="1">
-              <a:lnSpc>
-                <a:spcPct val="100000"/>
-              </a:lnSpc>
-              <a:spcBef>
-                <a:spcPts val="0"/>
-              </a:spcBef>
-              <a:spcAft>
-                <a:spcPts val="0"/>
-              </a:spcAft>
-              <a:buClr>
-                <a:schemeClr val="accent1"/>
-              </a:buClr>
-              <a:buSzPts val="2000"/>
-              <a:buFont typeface="Roboto Slab"/>
-              <a:buNone/>
-              <a:defRPr sz="2000" b="0" i="0" u="none" strike="noStrike" cap="none">
-                <a:solidFill>
-                  <a:schemeClr val="accent1"/>
-                </a:solidFill>
-                <a:latin typeface="Roboto Slab"/>
-                <a:ea typeface="Roboto Slab"/>
-                <a:cs typeface="Roboto Slab"/>
-                <a:sym typeface="Roboto Slab"/>
-              </a:defRPr>
-            </a:lvl4pPr>
-            <a:lvl5pPr marR="0" lvl="4" algn="l" rtl="0" eaLnBrk="1" hangingPunct="1">
-              <a:lnSpc>
-                <a:spcPct val="100000"/>
-              </a:lnSpc>
-              <a:spcBef>
-                <a:spcPts val="0"/>
-              </a:spcBef>
-              <a:spcAft>
-                <a:spcPts val="0"/>
-              </a:spcAft>
-              <a:buClr>
-                <a:schemeClr val="accent1"/>
-              </a:buClr>
-              <a:buSzPts val="2000"/>
-              <a:buFont typeface="Roboto Slab"/>
-              <a:buNone/>
-              <a:defRPr sz="2000" b="0" i="0" u="none" strike="noStrike" cap="none">
-                <a:solidFill>
-                  <a:schemeClr val="accent1"/>
-                </a:solidFill>
-                <a:latin typeface="Roboto Slab"/>
-                <a:ea typeface="Roboto Slab"/>
-                <a:cs typeface="Roboto Slab"/>
-                <a:sym typeface="Roboto Slab"/>
-              </a:defRPr>
-            </a:lvl5pPr>
-            <a:lvl6pPr marR="0" lvl="5" algn="l" rtl="0" eaLnBrk="1" hangingPunct="1">
-              <a:lnSpc>
-                <a:spcPct val="100000"/>
-              </a:lnSpc>
-              <a:spcBef>
-                <a:spcPts val="0"/>
-              </a:spcBef>
-              <a:spcAft>
-                <a:spcPts val="0"/>
-              </a:spcAft>
-              <a:buClr>
-                <a:schemeClr val="accent1"/>
-              </a:buClr>
-              <a:buSzPts val="2000"/>
-              <a:buFont typeface="Roboto Slab"/>
-              <a:buNone/>
-              <a:defRPr sz="2000" b="0" i="0" u="none" strike="noStrike" cap="none">
-                <a:solidFill>
-                  <a:schemeClr val="accent1"/>
-                </a:solidFill>
-                <a:latin typeface="Roboto Slab"/>
-                <a:ea typeface="Roboto Slab"/>
-                <a:cs typeface="Roboto Slab"/>
-                <a:sym typeface="Roboto Slab"/>
-              </a:defRPr>
-            </a:lvl6pPr>
-            <a:lvl7pPr marR="0" lvl="6" algn="l" rtl="0" eaLnBrk="1" hangingPunct="1">
-              <a:lnSpc>
-                <a:spcPct val="100000"/>
-              </a:lnSpc>
-              <a:spcBef>
-                <a:spcPts val="0"/>
-              </a:spcBef>
-              <a:spcAft>
-                <a:spcPts val="0"/>
-              </a:spcAft>
-              <a:buClr>
-                <a:schemeClr val="accent1"/>
-              </a:buClr>
-              <a:buSzPts val="2000"/>
-              <a:buFont typeface="Roboto Slab"/>
-              <a:buNone/>
-              <a:defRPr sz="2000" b="0" i="0" u="none" strike="noStrike" cap="none">
-                <a:solidFill>
-                  <a:schemeClr val="accent1"/>
-                </a:solidFill>
-                <a:latin typeface="Roboto Slab"/>
-                <a:ea typeface="Roboto Slab"/>
-                <a:cs typeface="Roboto Slab"/>
-                <a:sym typeface="Roboto Slab"/>
-              </a:defRPr>
-            </a:lvl7pPr>
-            <a:lvl8pPr marR="0" lvl="7" algn="l" rtl="0" eaLnBrk="1" hangingPunct="1">
-              <a:lnSpc>
-                <a:spcPct val="100000"/>
-              </a:lnSpc>
-              <a:spcBef>
-                <a:spcPts val="0"/>
-              </a:spcBef>
-              <a:spcAft>
-                <a:spcPts val="0"/>
-              </a:spcAft>
-              <a:buClr>
-                <a:schemeClr val="accent1"/>
-              </a:buClr>
-              <a:buSzPts val="2000"/>
-              <a:buFont typeface="Roboto Slab"/>
-              <a:buNone/>
-              <a:defRPr sz="2000" b="0" i="0" u="none" strike="noStrike" cap="none">
-                <a:solidFill>
-                  <a:schemeClr val="accent1"/>
-                </a:solidFill>
-                <a:latin typeface="Roboto Slab"/>
-                <a:ea typeface="Roboto Slab"/>
-                <a:cs typeface="Roboto Slab"/>
-                <a:sym typeface="Roboto Slab"/>
-              </a:defRPr>
-            </a:lvl8pPr>
-            <a:lvl9pPr marR="0" lvl="8" algn="l" rtl="0" eaLnBrk="1" hangingPunct="1">
-              <a:lnSpc>
-                <a:spcPct val="100000"/>
-              </a:lnSpc>
-              <a:spcBef>
-                <a:spcPts val="0"/>
-              </a:spcBef>
-              <a:spcAft>
-                <a:spcPts val="0"/>
-              </a:spcAft>
-              <a:buClr>
-                <a:schemeClr val="accent1"/>
-              </a:buClr>
-              <a:buSzPts val="2000"/>
-              <a:buFont typeface="Roboto Slab"/>
-              <a:buNone/>
-              <a:defRPr sz="2000" b="0" i="0" u="none" strike="noStrike" cap="none">
-                <a:solidFill>
-                  <a:schemeClr val="accent1"/>
-                </a:solidFill>
-                <a:latin typeface="Roboto Slab"/>
-                <a:ea typeface="Roboto Slab"/>
-                <a:cs typeface="Roboto Slab"/>
-                <a:sym typeface="Roboto Slab"/>
-              </a:defRPr>
-            </a:lvl9pPr>
-          </a:lstStyle>
-          <a:p>
-            <a:r>
-              <a:rPr lang="en-GB" sz="2600" dirty="0">
-                <a:latin typeface="Source Sans Pro"/>
-                <a:ea typeface="Source Sans Pro"/>
-              </a:rPr>
-              <a:t>Writing an EESSI test suite configuration</a:t>
-            </a:r>
-            <a:endParaRPr lang="en-US" sz="2600" dirty="0"/>
-          </a:p>
-        </p:txBody>
-      </p:sp>
-    </p:spTree>
-    <p:extLst>
-      <p:ext uri="{BB962C8B-B14F-4D97-AF65-F5344CB8AC3E}">
-        <p14:creationId xmlns:p14="http://schemas.microsoft.com/office/powerpoint/2010/main" val="4265618249"/>
-      </p:ext>
-    </p:extLst>
-  </p:cSld>
-  <p:clrMapOvr>
-    <a:masterClrMapping/>
-  </p:clrMapOvr>
-</p:sld>
-</file>
-
-<file path=ppt/slides/slide9.xml><?xml version="1.0" encoding="utf-8"?>
-<p:sld xmlns:a="http://schemas.openxmlformats.org/drawingml/2006/main" xmlns:r="http://schemas.openxmlformats.org/officeDocument/2006/relationships" xmlns:p="http://schemas.openxmlformats.org/presentationml/2006/main">
-  <p:cSld>
-    <p:spTree>
-      <p:nvGrpSpPr>
-        <p:cNvPr id="1" name="">
-          <a:extLst>
-            <a:ext uri="{FF2B5EF4-FFF2-40B4-BE49-F238E27FC236}">
               <a16:creationId xmlns:a16="http://schemas.microsoft.com/office/drawing/2014/main" id="{40C439C6-6B4D-7492-2415-80CF3EE32BB5}"/>
             </a:ext>
           </a:extLst>
@@ -21702,7 +20969,7 @@
             <a:fld id="{00000000-1234-1234-1234-123412341234}" type="slidenum">
               <a:rPr lang="en"/>
               <a:pPr algn="r"/>
-              <a:t>9</a:t>
+              <a:t>8</a:t>
             </a:fld>
             <a:endParaRPr lang="en" dirty="0"/>
           </a:p>
@@ -22002,6 +21269,703 @@
     <p:extLst>
       <p:ext uri="{BB962C8B-B14F-4D97-AF65-F5344CB8AC3E}">
         <p14:creationId xmlns:p14="http://schemas.microsoft.com/office/powerpoint/2010/main" val="2185835663"/>
+      </p:ext>
+    </p:extLst>
+  </p:cSld>
+  <p:clrMapOvr>
+    <a:masterClrMapping/>
+  </p:clrMapOvr>
+</p:sld>
+</file>
+
+<file path=ppt/slides/slide9.xml><?xml version="1.0" encoding="utf-8"?>
+<p:sld xmlns:a="http://schemas.openxmlformats.org/drawingml/2006/main" xmlns:r="http://schemas.openxmlformats.org/officeDocument/2006/relationships" xmlns:p="http://schemas.openxmlformats.org/presentationml/2006/main">
+  <p:cSld>
+    <p:spTree>
+      <p:nvGrpSpPr>
+        <p:cNvPr id="1" name="">
+          <a:extLst>
+            <a:ext uri="{FF2B5EF4-FFF2-40B4-BE49-F238E27FC236}">
+              <a16:creationId xmlns:a16="http://schemas.microsoft.com/office/drawing/2014/main" id="{D284020F-D1C3-F659-4847-1574422A77E4}"/>
+            </a:ext>
+          </a:extLst>
+        </p:cNvPr>
+        <p:cNvGrpSpPr/>
+        <p:nvPr/>
+      </p:nvGrpSpPr>
+      <p:grpSpPr>
+        <a:xfrm>
+          <a:off x="0" y="0"/>
+          <a:ext cx="0" cy="0"/>
+          <a:chOff x="0" y="0"/>
+          <a:chExt cx="0" cy="0"/>
+        </a:xfrm>
+      </p:grpSpPr>
+      <p:sp>
+        <p:nvSpPr>
+          <p:cNvPr id="5" name="Text Placeholder 4">
+            <a:extLst>
+              <a:ext uri="{FF2B5EF4-FFF2-40B4-BE49-F238E27FC236}">
+                <a16:creationId xmlns:a16="http://schemas.microsoft.com/office/drawing/2014/main" id="{CBEE9C12-4F61-7C08-E9A6-F911EB399C3F}"/>
+              </a:ext>
+            </a:extLst>
+          </p:cNvPr>
+          <p:cNvSpPr>
+            <a:spLocks noGrp="1"/>
+          </p:cNvSpPr>
+          <p:nvPr>
+            <p:ph type="body" idx="1"/>
+          </p:nvPr>
+        </p:nvSpPr>
+        <p:spPr>
+          <a:xfrm>
+            <a:off x="443017" y="788396"/>
+            <a:ext cx="8390739" cy="3791283"/>
+          </a:xfrm>
+        </p:spPr>
+        <p:txBody>
+          <a:bodyPr/>
+          <a:lstStyle/>
+          <a:p>
+            <a:pPr marL="76200" indent="0">
+              <a:buNone/>
+            </a:pPr>
+            <a:r>
+              <a:rPr lang="en-US" sz="1800" dirty="0"/>
+              <a:t>Goal: For everyone to have run the EESSI test suite on your HPC cluster (or laptop) by the end of EUM’25!</a:t>
+            </a:r>
+          </a:p>
+          <a:p>
+            <a:r>
+              <a:rPr lang="en-US" sz="1800" dirty="0"/>
+              <a:t>Step 1: install </a:t>
+            </a:r>
+            <a:r>
+              <a:rPr lang="en-US" sz="1800" dirty="0" err="1"/>
+              <a:t>ReFrame</a:t>
+            </a:r>
+            <a:r>
+              <a:rPr lang="en-US" sz="1800" dirty="0"/>
+              <a:t> &amp; the EESSI test suite</a:t>
+            </a:r>
+          </a:p>
+          <a:p>
+            <a:r>
+              <a:rPr lang="en-US" sz="1800" dirty="0"/>
+              <a:t>Step 2: create a </a:t>
+            </a:r>
+            <a:r>
+              <a:rPr lang="en-US" sz="1800" dirty="0" err="1"/>
+              <a:t>ReFrame</a:t>
+            </a:r>
+            <a:r>
+              <a:rPr lang="en-US" sz="1800" dirty="0"/>
+              <a:t> configuration file</a:t>
+            </a:r>
+          </a:p>
+          <a:p>
+            <a:r>
+              <a:rPr lang="en-US" sz="1800" dirty="0"/>
+              <a:t>Step 3: run reframe --list -t CI</a:t>
+            </a:r>
+          </a:p>
+          <a:p>
+            <a:r>
+              <a:rPr lang="en-US" sz="1800" dirty="0"/>
+              <a:t>Step 4: run reframe --dry-run -t CI -n /&lt;</a:t>
+            </a:r>
+            <a:r>
+              <a:rPr lang="en-US" sz="1800" dirty="0" err="1"/>
+              <a:t>somehash</a:t>
+            </a:r>
+            <a:r>
+              <a:rPr lang="en-US" sz="1800" dirty="0"/>
+              <a:t>&gt;</a:t>
+            </a:r>
+          </a:p>
+          <a:p>
+            <a:r>
+              <a:rPr lang="en-US" sz="1800" dirty="0"/>
+              <a:t>Step 5: run reframe --run -t CI -n /&lt;</a:t>
+            </a:r>
+            <a:r>
+              <a:rPr lang="en-US" sz="1800" dirty="0" err="1"/>
+              <a:t>somehash</a:t>
+            </a:r>
+            <a:r>
+              <a:rPr lang="en-US" sz="1800" dirty="0"/>
+              <a:t>&gt;</a:t>
+            </a:r>
+          </a:p>
+          <a:p>
+            <a:endParaRPr lang="en-US" sz="1800" dirty="0"/>
+          </a:p>
+          <a:p>
+            <a:endParaRPr lang="en-US" sz="1800" dirty="0"/>
+          </a:p>
+        </p:txBody>
+      </p:sp>
+      <p:sp>
+        <p:nvSpPr>
+          <p:cNvPr id="3" name="Google Shape;79;p13">
+            <a:extLst>
+              <a:ext uri="{FF2B5EF4-FFF2-40B4-BE49-F238E27FC236}">
+                <a16:creationId xmlns:a16="http://schemas.microsoft.com/office/drawing/2014/main" id="{568DDED2-C88F-0B39-C491-DBB6C128B415}"/>
+              </a:ext>
+            </a:extLst>
+          </p:cNvPr>
+          <p:cNvSpPr txBox="1">
+            <a:spLocks/>
+          </p:cNvSpPr>
+          <p:nvPr/>
+        </p:nvSpPr>
+        <p:spPr>
+          <a:xfrm>
+            <a:off x="-105683" y="4773864"/>
+            <a:ext cx="548700" cy="393600"/>
+          </a:xfrm>
+          <a:prstGeom prst="rect">
+            <a:avLst/>
+          </a:prstGeom>
+        </p:spPr>
+        <p:txBody>
+          <a:bodyPr spcFirstLastPara="1" wrap="square" lIns="91425" tIns="91425" rIns="91425" bIns="91425" anchor="t" anchorCtr="0">
+            <a:noAutofit/>
+          </a:bodyPr>
+          <a:lstStyle>
+            <a:defPPr marR="0" lvl="0" algn="l" rtl="0">
+              <a:lnSpc>
+                <a:spcPct val="100000"/>
+              </a:lnSpc>
+              <a:spcBef>
+                <a:spcPts val="0"/>
+              </a:spcBef>
+              <a:spcAft>
+                <a:spcPts val="0"/>
+              </a:spcAft>
+            </a:defPPr>
+            <a:lvl1pPr marR="0" lvl="0" algn="l" rtl="0">
+              <a:lnSpc>
+                <a:spcPct val="100000"/>
+              </a:lnSpc>
+              <a:spcBef>
+                <a:spcPts val="0"/>
+              </a:spcBef>
+              <a:spcAft>
+                <a:spcPts val="0"/>
+              </a:spcAft>
+              <a:buClr>
+                <a:srgbClr val="000000"/>
+              </a:buClr>
+              <a:buFont typeface="Arial"/>
+              <a:defRPr sz="1400" b="0" i="0" u="none" strike="noStrike" cap="none">
+                <a:solidFill>
+                  <a:srgbClr val="000000"/>
+                </a:solidFill>
+                <a:latin typeface="Arial"/>
+                <a:ea typeface="Arial"/>
+                <a:cs typeface="Arial"/>
+                <a:sym typeface="Arial"/>
+              </a:defRPr>
+            </a:lvl1pPr>
+            <a:lvl2pPr marR="0" lvl="1" algn="l" rtl="0">
+              <a:lnSpc>
+                <a:spcPct val="100000"/>
+              </a:lnSpc>
+              <a:spcBef>
+                <a:spcPts val="0"/>
+              </a:spcBef>
+              <a:spcAft>
+                <a:spcPts val="0"/>
+              </a:spcAft>
+              <a:buClr>
+                <a:srgbClr val="000000"/>
+              </a:buClr>
+              <a:buFont typeface="Arial"/>
+              <a:defRPr sz="1400" b="0" i="0" u="none" strike="noStrike" cap="none">
+                <a:solidFill>
+                  <a:srgbClr val="000000"/>
+                </a:solidFill>
+                <a:latin typeface="Arial"/>
+                <a:ea typeface="Arial"/>
+                <a:cs typeface="Arial"/>
+                <a:sym typeface="Arial"/>
+              </a:defRPr>
+            </a:lvl2pPr>
+            <a:lvl3pPr marR="0" lvl="2" algn="l" rtl="0">
+              <a:lnSpc>
+                <a:spcPct val="100000"/>
+              </a:lnSpc>
+              <a:spcBef>
+                <a:spcPts val="0"/>
+              </a:spcBef>
+              <a:spcAft>
+                <a:spcPts val="0"/>
+              </a:spcAft>
+              <a:buClr>
+                <a:srgbClr val="000000"/>
+              </a:buClr>
+              <a:buFont typeface="Arial"/>
+              <a:defRPr sz="1400" b="0" i="0" u="none" strike="noStrike" cap="none">
+                <a:solidFill>
+                  <a:srgbClr val="000000"/>
+                </a:solidFill>
+                <a:latin typeface="Arial"/>
+                <a:ea typeface="Arial"/>
+                <a:cs typeface="Arial"/>
+                <a:sym typeface="Arial"/>
+              </a:defRPr>
+            </a:lvl3pPr>
+            <a:lvl4pPr marR="0" lvl="3" algn="l" rtl="0">
+              <a:lnSpc>
+                <a:spcPct val="100000"/>
+              </a:lnSpc>
+              <a:spcBef>
+                <a:spcPts val="0"/>
+              </a:spcBef>
+              <a:spcAft>
+                <a:spcPts val="0"/>
+              </a:spcAft>
+              <a:buClr>
+                <a:srgbClr val="000000"/>
+              </a:buClr>
+              <a:buFont typeface="Arial"/>
+              <a:defRPr sz="1400" b="0" i="0" u="none" strike="noStrike" cap="none">
+                <a:solidFill>
+                  <a:srgbClr val="000000"/>
+                </a:solidFill>
+                <a:latin typeface="Arial"/>
+                <a:ea typeface="Arial"/>
+                <a:cs typeface="Arial"/>
+                <a:sym typeface="Arial"/>
+              </a:defRPr>
+            </a:lvl4pPr>
+            <a:lvl5pPr marR="0" lvl="4" algn="l" rtl="0">
+              <a:lnSpc>
+                <a:spcPct val="100000"/>
+              </a:lnSpc>
+              <a:spcBef>
+                <a:spcPts val="0"/>
+              </a:spcBef>
+              <a:spcAft>
+                <a:spcPts val="0"/>
+              </a:spcAft>
+              <a:buClr>
+                <a:srgbClr val="000000"/>
+              </a:buClr>
+              <a:buFont typeface="Arial"/>
+              <a:defRPr sz="1400" b="0" i="0" u="none" strike="noStrike" cap="none">
+                <a:solidFill>
+                  <a:srgbClr val="000000"/>
+                </a:solidFill>
+                <a:latin typeface="Arial"/>
+                <a:ea typeface="Arial"/>
+                <a:cs typeface="Arial"/>
+                <a:sym typeface="Arial"/>
+              </a:defRPr>
+            </a:lvl5pPr>
+            <a:lvl6pPr marR="0" lvl="5" algn="l" rtl="0">
+              <a:lnSpc>
+                <a:spcPct val="100000"/>
+              </a:lnSpc>
+              <a:spcBef>
+                <a:spcPts val="0"/>
+              </a:spcBef>
+              <a:spcAft>
+                <a:spcPts val="0"/>
+              </a:spcAft>
+              <a:buClr>
+                <a:srgbClr val="000000"/>
+              </a:buClr>
+              <a:buFont typeface="Arial"/>
+              <a:defRPr sz="1400" b="0" i="0" u="none" strike="noStrike" cap="none">
+                <a:solidFill>
+                  <a:srgbClr val="000000"/>
+                </a:solidFill>
+                <a:latin typeface="Arial"/>
+                <a:ea typeface="Arial"/>
+                <a:cs typeface="Arial"/>
+                <a:sym typeface="Arial"/>
+              </a:defRPr>
+            </a:lvl6pPr>
+            <a:lvl7pPr marR="0" lvl="6" algn="l" rtl="0">
+              <a:lnSpc>
+                <a:spcPct val="100000"/>
+              </a:lnSpc>
+              <a:spcBef>
+                <a:spcPts val="0"/>
+              </a:spcBef>
+              <a:spcAft>
+                <a:spcPts val="0"/>
+              </a:spcAft>
+              <a:buClr>
+                <a:srgbClr val="000000"/>
+              </a:buClr>
+              <a:buFont typeface="Arial"/>
+              <a:defRPr sz="1400" b="0" i="0" u="none" strike="noStrike" cap="none">
+                <a:solidFill>
+                  <a:srgbClr val="000000"/>
+                </a:solidFill>
+                <a:latin typeface="Arial"/>
+                <a:ea typeface="Arial"/>
+                <a:cs typeface="Arial"/>
+                <a:sym typeface="Arial"/>
+              </a:defRPr>
+            </a:lvl7pPr>
+            <a:lvl8pPr marR="0" lvl="7" algn="l" rtl="0">
+              <a:lnSpc>
+                <a:spcPct val="100000"/>
+              </a:lnSpc>
+              <a:spcBef>
+                <a:spcPts val="0"/>
+              </a:spcBef>
+              <a:spcAft>
+                <a:spcPts val="0"/>
+              </a:spcAft>
+              <a:buClr>
+                <a:srgbClr val="000000"/>
+              </a:buClr>
+              <a:buFont typeface="Arial"/>
+              <a:defRPr sz="1400" b="0" i="0" u="none" strike="noStrike" cap="none">
+                <a:solidFill>
+                  <a:srgbClr val="000000"/>
+                </a:solidFill>
+                <a:latin typeface="Arial"/>
+                <a:ea typeface="Arial"/>
+                <a:cs typeface="Arial"/>
+                <a:sym typeface="Arial"/>
+              </a:defRPr>
+            </a:lvl8pPr>
+            <a:lvl9pPr marR="0" lvl="8" algn="l" rtl="0">
+              <a:lnSpc>
+                <a:spcPct val="100000"/>
+              </a:lnSpc>
+              <a:spcBef>
+                <a:spcPts val="0"/>
+              </a:spcBef>
+              <a:spcAft>
+                <a:spcPts val="0"/>
+              </a:spcAft>
+              <a:buClr>
+                <a:srgbClr val="000000"/>
+              </a:buClr>
+              <a:buFont typeface="Arial"/>
+              <a:defRPr sz="1400" b="0" i="0" u="none" strike="noStrike" cap="none">
+                <a:solidFill>
+                  <a:srgbClr val="000000"/>
+                </a:solidFill>
+                <a:latin typeface="Arial"/>
+                <a:ea typeface="Arial"/>
+                <a:cs typeface="Arial"/>
+                <a:sym typeface="Arial"/>
+              </a:defRPr>
+            </a:lvl9pPr>
+          </a:lstStyle>
+          <a:p>
+            <a:pPr algn="r"/>
+            <a:fld id="{00000000-1234-1234-1234-123412341234}" type="slidenum">
+              <a:rPr lang="en"/>
+              <a:pPr algn="r"/>
+              <a:t>9</a:t>
+            </a:fld>
+            <a:endParaRPr lang="en" dirty="0"/>
+          </a:p>
+        </p:txBody>
+      </p:sp>
+      <p:sp>
+        <p:nvSpPr>
+          <p:cNvPr id="7" name="Title 3">
+            <a:extLst>
+              <a:ext uri="{FF2B5EF4-FFF2-40B4-BE49-F238E27FC236}">
+                <a16:creationId xmlns:a16="http://schemas.microsoft.com/office/drawing/2014/main" id="{1981D1B7-9D9D-244D-04CD-DA7D333C4A46}"/>
+              </a:ext>
+            </a:extLst>
+          </p:cNvPr>
+          <p:cNvSpPr txBox="1">
+            <a:spLocks/>
+          </p:cNvSpPr>
+          <p:nvPr/>
+        </p:nvSpPr>
+        <p:spPr>
+          <a:xfrm>
+            <a:off x="424543" y="70166"/>
+            <a:ext cx="8523515" cy="702600"/>
+          </a:xfrm>
+          <a:prstGeom prst="rect">
+            <a:avLst/>
+          </a:prstGeom>
+          <a:noFill/>
+          <a:ln>
+            <a:noFill/>
+          </a:ln>
+        </p:spPr>
+        <p:txBody>
+          <a:bodyPr spcFirstLastPara="1" wrap="square" lIns="91425" tIns="91425" rIns="91425" bIns="91425" anchor="b" anchorCtr="0">
+            <a:noAutofit/>
+          </a:bodyPr>
+          <a:lstStyle>
+            <a:defPPr marR="0" lvl="0" algn="l" rtl="0">
+              <a:lnSpc>
+                <a:spcPct val="100000"/>
+              </a:lnSpc>
+              <a:spcBef>
+                <a:spcPts val="0"/>
+              </a:spcBef>
+              <a:spcAft>
+                <a:spcPts val="0"/>
+              </a:spcAft>
+            </a:defPPr>
+            <a:lvl1pPr marR="0" lvl="0" algn="l" rtl="0" eaLnBrk="1" hangingPunct="1">
+              <a:lnSpc>
+                <a:spcPct val="100000"/>
+              </a:lnSpc>
+              <a:spcBef>
+                <a:spcPts val="0"/>
+              </a:spcBef>
+              <a:spcAft>
+                <a:spcPts val="0"/>
+              </a:spcAft>
+              <a:buClr>
+                <a:schemeClr val="accent1"/>
+              </a:buClr>
+              <a:buSzPts val="2000"/>
+              <a:buFont typeface="Roboto Slab"/>
+              <a:buNone/>
+              <a:defRPr sz="2800" b="0" i="0" u="none" strike="noStrike" cap="none">
+                <a:solidFill>
+                  <a:schemeClr val="accent1"/>
+                </a:solidFill>
+                <a:latin typeface="Source Sans Pro" panose="020B0503030403020204" pitchFamily="34" charset="0"/>
+                <a:ea typeface="Source Sans Pro" panose="020B0503030403020204" pitchFamily="34" charset="0"/>
+                <a:cs typeface="Roboto Slab"/>
+                <a:sym typeface="Roboto Slab"/>
+              </a:defRPr>
+            </a:lvl1pPr>
+            <a:lvl2pPr marR="0" lvl="1" algn="l" rtl="0" eaLnBrk="1" hangingPunct="1">
+              <a:lnSpc>
+                <a:spcPct val="100000"/>
+              </a:lnSpc>
+              <a:spcBef>
+                <a:spcPts val="0"/>
+              </a:spcBef>
+              <a:spcAft>
+                <a:spcPts val="0"/>
+              </a:spcAft>
+              <a:buClr>
+                <a:schemeClr val="accent1"/>
+              </a:buClr>
+              <a:buSzPts val="2000"/>
+              <a:buFont typeface="Roboto Slab"/>
+              <a:buNone/>
+              <a:defRPr sz="2000" b="0" i="0" u="none" strike="noStrike" cap="none">
+                <a:solidFill>
+                  <a:schemeClr val="accent1"/>
+                </a:solidFill>
+                <a:latin typeface="Roboto Slab"/>
+                <a:ea typeface="Roboto Slab"/>
+                <a:cs typeface="Roboto Slab"/>
+                <a:sym typeface="Roboto Slab"/>
+              </a:defRPr>
+            </a:lvl2pPr>
+            <a:lvl3pPr marR="0" lvl="2" algn="l" rtl="0" eaLnBrk="1" hangingPunct="1">
+              <a:lnSpc>
+                <a:spcPct val="100000"/>
+              </a:lnSpc>
+              <a:spcBef>
+                <a:spcPts val="0"/>
+              </a:spcBef>
+              <a:spcAft>
+                <a:spcPts val="0"/>
+              </a:spcAft>
+              <a:buClr>
+                <a:schemeClr val="accent1"/>
+              </a:buClr>
+              <a:buSzPts val="2000"/>
+              <a:buFont typeface="Roboto Slab"/>
+              <a:buNone/>
+              <a:defRPr sz="2000" b="0" i="0" u="none" strike="noStrike" cap="none">
+                <a:solidFill>
+                  <a:schemeClr val="accent1"/>
+                </a:solidFill>
+                <a:latin typeface="Roboto Slab"/>
+                <a:ea typeface="Roboto Slab"/>
+                <a:cs typeface="Roboto Slab"/>
+                <a:sym typeface="Roboto Slab"/>
+              </a:defRPr>
+            </a:lvl3pPr>
+            <a:lvl4pPr marR="0" lvl="3" algn="l" rtl="0" eaLnBrk="1" hangingPunct="1">
+              <a:lnSpc>
+                <a:spcPct val="100000"/>
+              </a:lnSpc>
+              <a:spcBef>
+                <a:spcPts val="0"/>
+              </a:spcBef>
+              <a:spcAft>
+                <a:spcPts val="0"/>
+              </a:spcAft>
+              <a:buClr>
+                <a:schemeClr val="accent1"/>
+              </a:buClr>
+              <a:buSzPts val="2000"/>
+              <a:buFont typeface="Roboto Slab"/>
+              <a:buNone/>
+              <a:defRPr sz="2000" b="0" i="0" u="none" strike="noStrike" cap="none">
+                <a:solidFill>
+                  <a:schemeClr val="accent1"/>
+                </a:solidFill>
+                <a:latin typeface="Roboto Slab"/>
+                <a:ea typeface="Roboto Slab"/>
+                <a:cs typeface="Roboto Slab"/>
+                <a:sym typeface="Roboto Slab"/>
+              </a:defRPr>
+            </a:lvl4pPr>
+            <a:lvl5pPr marR="0" lvl="4" algn="l" rtl="0" eaLnBrk="1" hangingPunct="1">
+              <a:lnSpc>
+                <a:spcPct val="100000"/>
+              </a:lnSpc>
+              <a:spcBef>
+                <a:spcPts val="0"/>
+              </a:spcBef>
+              <a:spcAft>
+                <a:spcPts val="0"/>
+              </a:spcAft>
+              <a:buClr>
+                <a:schemeClr val="accent1"/>
+              </a:buClr>
+              <a:buSzPts val="2000"/>
+              <a:buFont typeface="Roboto Slab"/>
+              <a:buNone/>
+              <a:defRPr sz="2000" b="0" i="0" u="none" strike="noStrike" cap="none">
+                <a:solidFill>
+                  <a:schemeClr val="accent1"/>
+                </a:solidFill>
+                <a:latin typeface="Roboto Slab"/>
+                <a:ea typeface="Roboto Slab"/>
+                <a:cs typeface="Roboto Slab"/>
+                <a:sym typeface="Roboto Slab"/>
+              </a:defRPr>
+            </a:lvl5pPr>
+            <a:lvl6pPr marR="0" lvl="5" algn="l" rtl="0" eaLnBrk="1" hangingPunct="1">
+              <a:lnSpc>
+                <a:spcPct val="100000"/>
+              </a:lnSpc>
+              <a:spcBef>
+                <a:spcPts val="0"/>
+              </a:spcBef>
+              <a:spcAft>
+                <a:spcPts val="0"/>
+              </a:spcAft>
+              <a:buClr>
+                <a:schemeClr val="accent1"/>
+              </a:buClr>
+              <a:buSzPts val="2000"/>
+              <a:buFont typeface="Roboto Slab"/>
+              <a:buNone/>
+              <a:defRPr sz="2000" b="0" i="0" u="none" strike="noStrike" cap="none">
+                <a:solidFill>
+                  <a:schemeClr val="accent1"/>
+                </a:solidFill>
+                <a:latin typeface="Roboto Slab"/>
+                <a:ea typeface="Roboto Slab"/>
+                <a:cs typeface="Roboto Slab"/>
+                <a:sym typeface="Roboto Slab"/>
+              </a:defRPr>
+            </a:lvl6pPr>
+            <a:lvl7pPr marR="0" lvl="6" algn="l" rtl="0" eaLnBrk="1" hangingPunct="1">
+              <a:lnSpc>
+                <a:spcPct val="100000"/>
+              </a:lnSpc>
+              <a:spcBef>
+                <a:spcPts val="0"/>
+              </a:spcBef>
+              <a:spcAft>
+                <a:spcPts val="0"/>
+              </a:spcAft>
+              <a:buClr>
+                <a:schemeClr val="accent1"/>
+              </a:buClr>
+              <a:buSzPts val="2000"/>
+              <a:buFont typeface="Roboto Slab"/>
+              <a:buNone/>
+              <a:defRPr sz="2000" b="0" i="0" u="none" strike="noStrike" cap="none">
+                <a:solidFill>
+                  <a:schemeClr val="accent1"/>
+                </a:solidFill>
+                <a:latin typeface="Roboto Slab"/>
+                <a:ea typeface="Roboto Slab"/>
+                <a:cs typeface="Roboto Slab"/>
+                <a:sym typeface="Roboto Slab"/>
+              </a:defRPr>
+            </a:lvl7pPr>
+            <a:lvl8pPr marR="0" lvl="7" algn="l" rtl="0" eaLnBrk="1" hangingPunct="1">
+              <a:lnSpc>
+                <a:spcPct val="100000"/>
+              </a:lnSpc>
+              <a:spcBef>
+                <a:spcPts val="0"/>
+              </a:spcBef>
+              <a:spcAft>
+                <a:spcPts val="0"/>
+              </a:spcAft>
+              <a:buClr>
+                <a:schemeClr val="accent1"/>
+              </a:buClr>
+              <a:buSzPts val="2000"/>
+              <a:buFont typeface="Roboto Slab"/>
+              <a:buNone/>
+              <a:defRPr sz="2000" b="0" i="0" u="none" strike="noStrike" cap="none">
+                <a:solidFill>
+                  <a:schemeClr val="accent1"/>
+                </a:solidFill>
+                <a:latin typeface="Roboto Slab"/>
+                <a:ea typeface="Roboto Slab"/>
+                <a:cs typeface="Roboto Slab"/>
+                <a:sym typeface="Roboto Slab"/>
+              </a:defRPr>
+            </a:lvl8pPr>
+            <a:lvl9pPr marR="0" lvl="8" algn="l" rtl="0" eaLnBrk="1" hangingPunct="1">
+              <a:lnSpc>
+                <a:spcPct val="100000"/>
+              </a:lnSpc>
+              <a:spcBef>
+                <a:spcPts val="0"/>
+              </a:spcBef>
+              <a:spcAft>
+                <a:spcPts val="0"/>
+              </a:spcAft>
+              <a:buClr>
+                <a:schemeClr val="accent1"/>
+              </a:buClr>
+              <a:buSzPts val="2000"/>
+              <a:buFont typeface="Roboto Slab"/>
+              <a:buNone/>
+              <a:defRPr sz="2000" b="0" i="0" u="none" strike="noStrike" cap="none">
+                <a:solidFill>
+                  <a:schemeClr val="accent1"/>
+                </a:solidFill>
+                <a:latin typeface="Roboto Slab"/>
+                <a:ea typeface="Roboto Slab"/>
+                <a:cs typeface="Roboto Slab"/>
+                <a:sym typeface="Roboto Slab"/>
+              </a:defRPr>
+            </a:lvl9pPr>
+          </a:lstStyle>
+          <a:p>
+            <a:r>
+              <a:rPr lang="en-GB" sz="2600" dirty="0">
+                <a:latin typeface="Source Sans Pro"/>
+                <a:ea typeface="Source Sans Pro"/>
+              </a:rPr>
+              <a:t>Writing an EESSI test suite configuration</a:t>
+            </a:r>
+            <a:endParaRPr lang="en-US" sz="2600" dirty="0"/>
+          </a:p>
+        </p:txBody>
+      </p:sp>
+    </p:spTree>
+    <p:extLst>
+      <p:ext uri="{BB962C8B-B14F-4D97-AF65-F5344CB8AC3E}">
+        <p14:creationId xmlns:p14="http://schemas.microsoft.com/office/powerpoint/2010/main" val="4265618249"/>
       </p:ext>
     </p:extLst>
   </p:cSld>

</xml_diff>